<commit_message>
Update report. Update slide. Update LibSVM.
</commit_message>
<xml_diff>
--- a/Local Adaptive SVM for Object Recognition.pptx
+++ b/Local Adaptive SVM for Object Recognition.pptx
@@ -269,7 +269,7 @@
           <a:p>
             <a:fld id="{3D3C0004-2429-4EF5-90FF-6D920603CCA6}" type="datetimeFigureOut">
               <a:rPr lang="en-US" smtClean="0"/>
-              <a:t>15/10/2014</a:t>
+              <a:t>16/10/2014</a:t>
             </a:fld>
             <a:endParaRPr lang="en-US"/>
           </a:p>
@@ -434,7 +434,7 @@
           <a:p>
             <a:fld id="{338C645B-E694-4194-92C0-EC8651A1DDF6}" type="datetimeFigureOut">
               <a:rPr lang="en-US" smtClean="0"/>
-              <a:t>15/10/2014</a:t>
+              <a:t>16/10/2014</a:t>
             </a:fld>
             <a:endParaRPr lang="en-US"/>
           </a:p>
@@ -756,7 +756,7 @@
             </a:r>
             <a:r>
               <a:rPr lang="en-US" baseline="0" smtClean="0"/>
-              <a:t>1.1</a:t>
+              <a:t>1.1.1</a:t>
             </a:r>
             <a:endParaRPr lang="en-US" baseline="0" smtClean="0"/>
           </a:p>
@@ -767,7 +767,7 @@
             </a:r>
             <a:r>
               <a:rPr lang="en-US" baseline="0" smtClean="0"/>
-              <a:t>15, </a:t>
+              <a:t>16, </a:t>
             </a:r>
             <a:r>
               <a:rPr lang="en-US" baseline="0" smtClean="0"/>
@@ -804,6 +804,90 @@
     <p:extLst>
       <p:ext uri="{BB962C8B-B14F-4D97-AF65-F5344CB8AC3E}">
         <p14:creationId xmlns:p14="http://schemas.microsoft.com/office/powerpoint/2010/main" val="3777827593"/>
+      </p:ext>
+    </p:extLst>
+  </p:cSld>
+  <p:clrMapOvr>
+    <a:masterClrMapping/>
+  </p:clrMapOvr>
+</p:notes>
+</file>
+
+<file path=ppt/notesSlides/notesSlide10.xml><?xml version="1.0" encoding="utf-8"?>
+<p:notes xmlns:a="http://schemas.openxmlformats.org/drawingml/2006/main" xmlns:r="http://schemas.openxmlformats.org/officeDocument/2006/relationships" xmlns:p="http://schemas.openxmlformats.org/presentationml/2006/main">
+  <p:cSld>
+    <p:spTree>
+      <p:nvGrpSpPr>
+        <p:cNvPr id="1" name=""/>
+        <p:cNvGrpSpPr/>
+        <p:nvPr/>
+      </p:nvGrpSpPr>
+      <p:grpSpPr>
+        <a:xfrm>
+          <a:off x="0" y="0"/>
+          <a:ext cx="0" cy="0"/>
+          <a:chOff x="0" y="0"/>
+          <a:chExt cx="0" cy="0"/>
+        </a:xfrm>
+      </p:grpSpPr>
+      <p:sp>
+        <p:nvSpPr>
+          <p:cNvPr id="2" name="Slide Image Placeholder 1"/>
+          <p:cNvSpPr>
+            <a:spLocks noGrp="1" noRot="1" noChangeAspect="1"/>
+          </p:cNvSpPr>
+          <p:nvPr>
+            <p:ph type="sldImg"/>
+          </p:nvPr>
+        </p:nvSpPr>
+        <p:spPr/>
+      </p:sp>
+      <p:sp>
+        <p:nvSpPr>
+          <p:cNvPr id="3" name="Notes Placeholder 2"/>
+          <p:cNvSpPr>
+            <a:spLocks noGrp="1"/>
+          </p:cNvSpPr>
+          <p:nvPr>
+            <p:ph type="body" idx="1"/>
+          </p:nvPr>
+        </p:nvSpPr>
+        <p:spPr/>
+        <p:txBody>
+          <a:bodyPr/>
+          <a:lstStyle/>
+          <a:p>
+            <a:endParaRPr lang="en-US"/>
+          </a:p>
+        </p:txBody>
+      </p:sp>
+      <p:sp>
+        <p:nvSpPr>
+          <p:cNvPr id="4" name="Slide Number Placeholder 3"/>
+          <p:cNvSpPr>
+            <a:spLocks noGrp="1"/>
+          </p:cNvSpPr>
+          <p:nvPr>
+            <p:ph type="sldNum" sz="quarter" idx="10"/>
+          </p:nvPr>
+        </p:nvSpPr>
+        <p:spPr/>
+        <p:txBody>
+          <a:bodyPr/>
+          <a:lstStyle/>
+          <a:p>
+            <a:fld id="{B1B799E3-7B79-4750-A540-F3E29E727FAD}" type="slidenum">
+              <a:rPr lang="en-US" smtClean="0"/>
+              <a:t>29</a:t>
+            </a:fld>
+            <a:endParaRPr lang="en-US"/>
+          </a:p>
+        </p:txBody>
+      </p:sp>
+    </p:spTree>
+    <p:extLst>
+      <p:ext uri="{BB962C8B-B14F-4D97-AF65-F5344CB8AC3E}">
+        <p14:creationId xmlns:p14="http://schemas.microsoft.com/office/powerpoint/2010/main" val="2600655372"/>
       </p:ext>
     </p:extLst>
   </p:cSld>
@@ -977,29 +1061,54 @@
           <a:bodyPr/>
           <a:lstStyle/>
           <a:p>
-            <a:pPr marL="0" marR="0" indent="0" algn="l" defTabSz="914400" rtl="0" eaLnBrk="1" fontAlgn="auto" latinLnBrk="0" hangingPunct="1">
-              <a:lnSpc>
-                <a:spcPct val="100000"/>
-              </a:lnSpc>
-              <a:spcBef>
-                <a:spcPts val="0"/>
-              </a:spcBef>
-              <a:spcAft>
-                <a:spcPts val="0"/>
-              </a:spcAft>
-              <a:buClrTx/>
-              <a:buSzTx/>
-              <a:buFontTx/>
+            <a:pPr lvl="0">
+              <a:buFont typeface="+mj-lt"/>
               <a:buNone/>
-              <a:tabLst/>
-              <a:defRPr/>
             </a:pPr>
             <a:r>
-              <a:rPr lang="en-US" smtClean="0"/>
-              <a:t>Pre-processing images using PCA is a common approach in object recognition experiments to reduce dimensionality. This can result in vastly reduced computational cost. In our experiments, the results are obtained by reducing the dimensionality of images by projecting data on the first few eigenfaces.</a:t>
-            </a:r>
-          </a:p>
-          <a:p>
+              <a:rPr lang="en-US" sz="1200" smtClean="0"/>
+              <a:t>NCA:</a:t>
+            </a:r>
+            <a:r>
+              <a:rPr lang="en-US" sz="1200" baseline="0" smtClean="0"/>
+              <a:t> </a:t>
+            </a:r>
+            <a:r>
+              <a:rPr lang="en-US" sz="1200" smtClean="0"/>
+              <a:t>Neighborhood component analysis</a:t>
+            </a:r>
+          </a:p>
+          <a:p>
+            <a:pPr lvl="0">
+              <a:buFont typeface="+mj-lt"/>
+              <a:buNone/>
+            </a:pPr>
+            <a:r>
+              <a:rPr lang="en-US" sz="1200" smtClean="0"/>
+              <a:t>LMNN:</a:t>
+            </a:r>
+            <a:r>
+              <a:rPr lang="en-US" sz="1200" baseline="0" smtClean="0"/>
+              <a:t> L</a:t>
+            </a:r>
+            <a:r>
+              <a:rPr lang="en-US" sz="1200" smtClean="0"/>
+              <a:t>arge Margin Nearest Neighbor</a:t>
+            </a:r>
+          </a:p>
+          <a:p>
+            <a:pPr lvl="0">
+              <a:buFont typeface="+mj-lt"/>
+              <a:buNone/>
+            </a:pPr>
+            <a:r>
+              <a:rPr lang="en-US" smtClean="0"/>
+              <a:t>DANN: </a:t>
+            </a:r>
+            <a:r>
+              <a:rPr lang="en-US" sz="1200" smtClean="0"/>
+              <a:t>Discriminative Adaptive Nearest Neighbor</a:t>
+            </a:r>
             <a:endParaRPr lang="en-US"/>
           </a:p>
         </p:txBody>
@@ -1021,7 +1130,7 @@
           <a:p>
             <a:fld id="{B1B799E3-7B79-4750-A540-F3E29E727FAD}" type="slidenum">
               <a:rPr lang="en-US" smtClean="0"/>
-              <a:t>23</a:t>
+              <a:t>19</a:t>
             </a:fld>
             <a:endParaRPr lang="en-US"/>
           </a:p>
@@ -1030,7 +1139,7 @@
     </p:spTree>
     <p:extLst>
       <p:ext uri="{BB962C8B-B14F-4D97-AF65-F5344CB8AC3E}">
-        <p14:creationId xmlns:p14="http://schemas.microsoft.com/office/powerpoint/2010/main" val="694380788"/>
+        <p14:creationId xmlns:p14="http://schemas.microsoft.com/office/powerpoint/2010/main" val="3299203659"/>
       </p:ext>
     </p:extLst>
   </p:cSld>
@@ -1084,22 +1193,29 @@
           <a:bodyPr/>
           <a:lstStyle/>
           <a:p>
-            <a:r>
-              <a:rPr lang="en-US" smtClean="0"/>
-              <a:t>Yalefaces, YalefacesB, AT&amp;T and Caltechfaces were used to study local adaptive SVM performance.</a:t>
-            </a:r>
-          </a:p>
-          <a:p>
-            <a:r>
-              <a:rPr lang="en-US" smtClean="0"/>
-              <a:t>The Yalefaces, YalefacesB and AT&amp;T databases are well-known in face recognition research. Caltechfaces and CaltechfacesB constitute images from the face category in the Caltech-101 object database.</a:t>
-            </a:r>
-          </a:p>
-          <a:p>
-            <a:r>
-              <a:rPr lang="en-US" smtClean="0"/>
-              <a:t>The Caltech-101 face category has 435 images of around 20 people. The Caltechfaces database in table I is based on splitting the Caltech-101 face category into 20 categories, each belonging to a different person. On the other hand, CaltechfacesB in table I is based on splitting the Caltech-101 face category into two classes only: male and female.</a:t>
-            </a:r>
+            <a:pPr marL="0" marR="0" indent="0" algn="l" defTabSz="914400" rtl="0" eaLnBrk="1" fontAlgn="auto" latinLnBrk="0" hangingPunct="1">
+              <a:lnSpc>
+                <a:spcPct val="100000"/>
+              </a:lnSpc>
+              <a:spcBef>
+                <a:spcPts val="0"/>
+              </a:spcBef>
+              <a:spcAft>
+                <a:spcPts val="0"/>
+              </a:spcAft>
+              <a:buClrTx/>
+              <a:buSzTx/>
+              <a:buFontTx/>
+              <a:buNone/>
+              <a:tabLst/>
+              <a:defRPr/>
+            </a:pPr>
+            <a:r>
+              <a:rPr lang="en-US" smtClean="0"/>
+              <a:t>Pre-processing images using PCA is a common approach in object recognition experiments to reduce dimensionality. This can result in vastly reduced computational cost. In our experiments, the results are obtained by reducing the dimensionality of images by projecting data on the first few eigenfaces.</a:t>
+            </a:r>
+          </a:p>
+          <a:p>
             <a:endParaRPr lang="en-US"/>
           </a:p>
         </p:txBody>
@@ -1121,7 +1237,7 @@
           <a:p>
             <a:fld id="{B1B799E3-7B79-4750-A540-F3E29E727FAD}" type="slidenum">
               <a:rPr lang="en-US" smtClean="0"/>
-              <a:t>24</a:t>
+              <a:t>23</a:t>
             </a:fld>
             <a:endParaRPr lang="en-US"/>
           </a:p>
@@ -1130,7 +1246,7 @@
     </p:spTree>
     <p:extLst>
       <p:ext uri="{BB962C8B-B14F-4D97-AF65-F5344CB8AC3E}">
-        <p14:creationId xmlns:p14="http://schemas.microsoft.com/office/powerpoint/2010/main" val="2379405525"/>
+        <p14:creationId xmlns:p14="http://schemas.microsoft.com/office/powerpoint/2010/main" val="694380788"/>
       </p:ext>
     </p:extLst>
   </p:cSld>
@@ -1186,7 +1302,19 @@
           <a:p>
             <a:r>
               <a:rPr lang="en-US" smtClean="0"/>
-              <a:t>Note that all SVM formulations are trained with a Gaussian kernel and a one-versus-all strategy is employed.</a:t>
+              <a:t>Yalefaces, YalefacesB, AT&amp;T and Caltechfaces were used to study local adaptive SVM performance.</a:t>
+            </a:r>
+          </a:p>
+          <a:p>
+            <a:r>
+              <a:rPr lang="en-US" smtClean="0"/>
+              <a:t>The Yalefaces, YalefacesB and AT&amp;T databases are well-known in face recognition research. Caltechfaces and CaltechfacesB constitute images from the face category in the Caltech-101 object database.</a:t>
+            </a:r>
+          </a:p>
+          <a:p>
+            <a:r>
+              <a:rPr lang="en-US" smtClean="0"/>
+              <a:t>The Caltech-101 face category has 435 images of around 20 people. The Caltechfaces database in table I is based on splitting the Caltech-101 face category into 20 categories, each belonging to a different person. On the other hand, CaltechfacesB in table I is based on splitting the Caltech-101 face category into two classes only: male and female.</a:t>
             </a:r>
             <a:endParaRPr lang="en-US"/>
           </a:p>
@@ -1209,7 +1337,7 @@
           <a:p>
             <a:fld id="{B1B799E3-7B79-4750-A540-F3E29E727FAD}" type="slidenum">
               <a:rPr lang="en-US" smtClean="0"/>
-              <a:t>25</a:t>
+              <a:t>24</a:t>
             </a:fld>
             <a:endParaRPr lang="en-US"/>
           </a:p>
@@ -1218,7 +1346,7 @@
     </p:spTree>
     <p:extLst>
       <p:ext uri="{BB962C8B-B14F-4D97-AF65-F5344CB8AC3E}">
-        <p14:creationId xmlns:p14="http://schemas.microsoft.com/office/powerpoint/2010/main" val="1861595058"/>
+        <p14:creationId xmlns:p14="http://schemas.microsoft.com/office/powerpoint/2010/main" val="2379405525"/>
       </p:ext>
     </p:extLst>
   </p:cSld>
@@ -1272,6 +1400,10 @@
           <a:bodyPr/>
           <a:lstStyle/>
           <a:p>
+            <a:r>
+              <a:rPr lang="en-US" smtClean="0"/>
+              <a:t>Note that all SVM formulations are trained with a Gaussian kernel and a one-versus-all strategy is employed.</a:t>
+            </a:r>
             <a:endParaRPr lang="en-US"/>
           </a:p>
         </p:txBody>
@@ -1293,7 +1425,7 @@
           <a:p>
             <a:fld id="{B1B799E3-7B79-4750-A540-F3E29E727FAD}" type="slidenum">
               <a:rPr lang="en-US" smtClean="0"/>
-              <a:t>26</a:t>
+              <a:t>25</a:t>
             </a:fld>
             <a:endParaRPr lang="en-US"/>
           </a:p>
@@ -1302,7 +1434,7 @@
     </p:spTree>
     <p:extLst>
       <p:ext uri="{BB962C8B-B14F-4D97-AF65-F5344CB8AC3E}">
-        <p14:creationId xmlns:p14="http://schemas.microsoft.com/office/powerpoint/2010/main" val="378005320"/>
+        <p14:creationId xmlns:p14="http://schemas.microsoft.com/office/powerpoint/2010/main" val="1861595058"/>
       </p:ext>
     </p:extLst>
   </p:cSld>
@@ -1377,7 +1509,7 @@
           <a:p>
             <a:fld id="{B1B799E3-7B79-4750-A540-F3E29E727FAD}" type="slidenum">
               <a:rPr lang="en-US" smtClean="0"/>
-              <a:t>27</a:t>
+              <a:t>26</a:t>
             </a:fld>
             <a:endParaRPr lang="en-US"/>
           </a:p>
@@ -1386,7 +1518,7 @@
     </p:spTree>
     <p:extLst>
       <p:ext uri="{BB962C8B-B14F-4D97-AF65-F5344CB8AC3E}">
-        <p14:creationId xmlns:p14="http://schemas.microsoft.com/office/powerpoint/2010/main" val="4111367983"/>
+        <p14:creationId xmlns:p14="http://schemas.microsoft.com/office/powerpoint/2010/main" val="378005320"/>
       </p:ext>
     </p:extLst>
   </p:cSld>
@@ -1461,7 +1593,7 @@
           <a:p>
             <a:fld id="{B1B799E3-7B79-4750-A540-F3E29E727FAD}" type="slidenum">
               <a:rPr lang="en-US" smtClean="0"/>
-              <a:t>28</a:t>
+              <a:t>27</a:t>
             </a:fld>
             <a:endParaRPr lang="en-US"/>
           </a:p>
@@ -1470,7 +1602,7 @@
     </p:spTree>
     <p:extLst>
       <p:ext uri="{BB962C8B-B14F-4D97-AF65-F5344CB8AC3E}">
-        <p14:creationId xmlns:p14="http://schemas.microsoft.com/office/powerpoint/2010/main" val="4053799295"/>
+        <p14:creationId xmlns:p14="http://schemas.microsoft.com/office/powerpoint/2010/main" val="4111367983"/>
       </p:ext>
     </p:extLst>
   </p:cSld>
@@ -1545,7 +1677,7 @@
           <a:p>
             <a:fld id="{B1B799E3-7B79-4750-A540-F3E29E727FAD}" type="slidenum">
               <a:rPr lang="en-US" smtClean="0"/>
-              <a:t>29</a:t>
+              <a:t>28</a:t>
             </a:fld>
             <a:endParaRPr lang="en-US"/>
           </a:p>
@@ -1554,7 +1686,7 @@
     </p:spTree>
     <p:extLst>
       <p:ext uri="{BB962C8B-B14F-4D97-AF65-F5344CB8AC3E}">
-        <p14:creationId xmlns:p14="http://schemas.microsoft.com/office/powerpoint/2010/main" val="2600655372"/>
+        <p14:creationId xmlns:p14="http://schemas.microsoft.com/office/powerpoint/2010/main" val="4053799295"/>
       </p:ext>
     </p:extLst>
   </p:cSld>
@@ -5233,23 +5365,7 @@
                   <a:srgbClr val="000000"/>
                 </a:solidFill>
               </a:rPr>
-              <a:t> </a:t>
-            </a:r>
-            <a:r>
-              <a:rPr lang="en-US" sz="1600" b="1" smtClean="0">
-                <a:solidFill>
-                  <a:srgbClr val="000000"/>
-                </a:solidFill>
-              </a:rPr>
-              <a:t>- </a:t>
-            </a:r>
-            <a:r>
-              <a:rPr lang="en-US" sz="1600" b="1" smtClean="0">
-                <a:solidFill>
-                  <a:srgbClr val="000000"/>
-                </a:solidFill>
-              </a:rPr>
-              <a:t>1311058</a:t>
+              <a:t> - 1311058</a:t>
             </a:r>
           </a:p>
           <a:p>
@@ -9844,7 +9960,12 @@
             <p:ph idx="1"/>
           </p:nvPr>
         </p:nvSpPr>
-        <p:spPr/>
+        <p:spPr>
+          <a:xfrm>
+            <a:off x="457200" y="1447800"/>
+            <a:ext cx="8305800" cy="4800600"/>
+          </a:xfrm>
+        </p:spPr>
         <p:txBody>
           <a:bodyPr/>
           <a:lstStyle/>
@@ -9925,7 +10046,7 @@
             </a:r>
             <a:r>
               <a:rPr lang="en-US" smtClean="0"/>
-              <a:t>adaptive eighborhood of the </a:t>
+              <a:t>adaptive neighborhood of the </a:t>
             </a:r>
             <a:r>
               <a:rPr lang="en-US"/>
@@ -17801,7 +17922,12 @@
             <p:ph idx="1"/>
           </p:nvPr>
         </p:nvSpPr>
-        <p:spPr/>
+        <p:spPr>
+          <a:xfrm>
+            <a:off x="457200" y="1447800"/>
+            <a:ext cx="8382000" cy="4800600"/>
+          </a:xfrm>
+        </p:spPr>
         <p:txBody>
           <a:bodyPr/>
           <a:lstStyle/>
@@ -18157,7 +18283,15 @@
             </a:r>
             <a:r>
               <a:rPr lang="en-US"/>
-              <a:t>simple Euclidean distance. Indeeed Zhang et al. </a:t>
+              <a:t>simple Euclidean distance. </a:t>
+            </a:r>
+            <a:r>
+              <a:rPr lang="en-US" smtClean="0"/>
+              <a:t>Indeed </a:t>
+            </a:r>
+            <a:r>
+              <a:rPr lang="en-US"/>
+              <a:t>Zhang et al. </a:t>
             </a:r>
             <a:r>
               <a:rPr lang="en-US" smtClean="0"/>
@@ -19404,8 +19538,8 @@
           </a:p>
         </p:txBody>
       </p:sp>
-      <mc:AlternateContent xmlns:mc="http://schemas.openxmlformats.org/markup-compatibility/2006">
-        <mc:Choice xmlns:a14="http://schemas.microsoft.com/office/drawing/2010/main" Requires="a14">
+      <mc:AlternateContent xmlns:mc="http://schemas.openxmlformats.org/markup-compatibility/2006" xmlns:a14="http://schemas.microsoft.com/office/drawing/2010/main">
+        <mc:Choice Requires="a14">
           <p:sp>
             <p:nvSpPr>
               <p:cNvPr id="3" name="Content Placeholder 2"/>
@@ -21209,7 +21343,7 @@
             </p:txBody>
           </p:sp>
         </mc:Choice>
-        <mc:Fallback>
+        <mc:Fallback xmlns="">
           <p:sp>
             <p:nvSpPr>
               <p:cNvPr id="3" name="Content Placeholder 2"/>

</xml_diff>